<commit_message>
finish project minisharingFiles DXC VN
</commit_message>
<xml_diff>
--- a/show/minishearingfile.pptx
+++ b/show/minishearingfile.pptx
@@ -13,10 +13,17 @@
     <p:sldId id="261" r:id="rId7"/>
     <p:sldId id="262" r:id="rId8"/>
     <p:sldId id="263" r:id="rId9"/>
-    <p:sldId id="264" r:id="rId10"/>
-    <p:sldId id="267" r:id="rId11"/>
-    <p:sldId id="265" r:id="rId12"/>
-    <p:sldId id="266" r:id="rId13"/>
+    <p:sldId id="274" r:id="rId10"/>
+    <p:sldId id="264" r:id="rId11"/>
+    <p:sldId id="267" r:id="rId12"/>
+    <p:sldId id="265" r:id="rId13"/>
+    <p:sldId id="268" r:id="rId14"/>
+    <p:sldId id="269" r:id="rId15"/>
+    <p:sldId id="270" r:id="rId16"/>
+    <p:sldId id="271" r:id="rId17"/>
+    <p:sldId id="272" r:id="rId18"/>
+    <p:sldId id="273" r:id="rId19"/>
+    <p:sldId id="266" r:id="rId20"/>
   </p:sldIdLst>
   <p:sldSz cx="9144000" cy="6858000" type="screen4x3"/>
   <p:notesSz cx="6858000" cy="9144000"/>
@@ -299,7 +306,7 @@
           <a:p>
             <a:fld id="{8F3C249C-FC48-4205-94DA-9BFBAC3FBAB7}" type="datetimeFigureOut">
               <a:rPr lang="en-US" smtClean="0"/>
-              <a:t>3/16/2018</a:t>
+              <a:t>3/15/2018</a:t>
             </a:fld>
             <a:endParaRPr lang="en-US"/>
           </a:p>
@@ -469,7 +476,7 @@
           <a:p>
             <a:fld id="{8F3C249C-FC48-4205-94DA-9BFBAC3FBAB7}" type="datetimeFigureOut">
               <a:rPr lang="en-US" smtClean="0"/>
-              <a:t>3/16/2018</a:t>
+              <a:t>3/15/2018</a:t>
             </a:fld>
             <a:endParaRPr lang="en-US"/>
           </a:p>
@@ -649,7 +656,7 @@
           <a:p>
             <a:fld id="{8F3C249C-FC48-4205-94DA-9BFBAC3FBAB7}" type="datetimeFigureOut">
               <a:rPr lang="en-US" smtClean="0"/>
-              <a:t>3/16/2018</a:t>
+              <a:t>3/15/2018</a:t>
             </a:fld>
             <a:endParaRPr lang="en-US"/>
           </a:p>
@@ -819,7 +826,7 @@
           <a:p>
             <a:fld id="{8F3C249C-FC48-4205-94DA-9BFBAC3FBAB7}" type="datetimeFigureOut">
               <a:rPr lang="en-US" smtClean="0"/>
-              <a:t>3/16/2018</a:t>
+              <a:t>3/15/2018</a:t>
             </a:fld>
             <a:endParaRPr lang="en-US"/>
           </a:p>
@@ -1065,7 +1072,7 @@
           <a:p>
             <a:fld id="{8F3C249C-FC48-4205-94DA-9BFBAC3FBAB7}" type="datetimeFigureOut">
               <a:rPr lang="en-US" smtClean="0"/>
-              <a:t>3/16/2018</a:t>
+              <a:t>3/15/2018</a:t>
             </a:fld>
             <a:endParaRPr lang="en-US"/>
           </a:p>
@@ -1353,7 +1360,7 @@
           <a:p>
             <a:fld id="{8F3C249C-FC48-4205-94DA-9BFBAC3FBAB7}" type="datetimeFigureOut">
               <a:rPr lang="en-US" smtClean="0"/>
-              <a:t>3/16/2018</a:t>
+              <a:t>3/15/2018</a:t>
             </a:fld>
             <a:endParaRPr lang="en-US"/>
           </a:p>
@@ -1775,7 +1782,7 @@
           <a:p>
             <a:fld id="{8F3C249C-FC48-4205-94DA-9BFBAC3FBAB7}" type="datetimeFigureOut">
               <a:rPr lang="en-US" smtClean="0"/>
-              <a:t>3/16/2018</a:t>
+              <a:t>3/15/2018</a:t>
             </a:fld>
             <a:endParaRPr lang="en-US"/>
           </a:p>
@@ -1893,7 +1900,7 @@
           <a:p>
             <a:fld id="{8F3C249C-FC48-4205-94DA-9BFBAC3FBAB7}" type="datetimeFigureOut">
               <a:rPr lang="en-US" smtClean="0"/>
-              <a:t>3/16/2018</a:t>
+              <a:t>3/15/2018</a:t>
             </a:fld>
             <a:endParaRPr lang="en-US"/>
           </a:p>
@@ -1988,7 +1995,7 @@
           <a:p>
             <a:fld id="{8F3C249C-FC48-4205-94DA-9BFBAC3FBAB7}" type="datetimeFigureOut">
               <a:rPr lang="en-US" smtClean="0"/>
-              <a:t>3/16/2018</a:t>
+              <a:t>3/15/2018</a:t>
             </a:fld>
             <a:endParaRPr lang="en-US"/>
           </a:p>
@@ -2265,7 +2272,7 @@
           <a:p>
             <a:fld id="{8F3C249C-FC48-4205-94DA-9BFBAC3FBAB7}" type="datetimeFigureOut">
               <a:rPr lang="en-US" smtClean="0"/>
-              <a:t>3/16/2018</a:t>
+              <a:t>3/15/2018</a:t>
             </a:fld>
             <a:endParaRPr lang="en-US"/>
           </a:p>
@@ -2518,7 +2525,7 @@
           <a:p>
             <a:fld id="{8F3C249C-FC48-4205-94DA-9BFBAC3FBAB7}" type="datetimeFigureOut">
               <a:rPr lang="en-US" smtClean="0"/>
-              <a:t>3/16/2018</a:t>
+              <a:t>3/15/2018</a:t>
             </a:fld>
             <a:endParaRPr lang="en-US"/>
           </a:p>
@@ -2731,7 +2738,7 @@
           <a:p>
             <a:fld id="{8F3C249C-FC48-4205-94DA-9BFBAC3FBAB7}" type="datetimeFigureOut">
               <a:rPr lang="en-US" smtClean="0"/>
-              <a:t>3/16/2018</a:t>
+              <a:t>3/15/2018</a:t>
             </a:fld>
             <a:endParaRPr lang="en-US"/>
           </a:p>
@@ -3145,8 +3152,8 @@
         </p:nvSpPr>
         <p:spPr>
           <a:xfrm>
-            <a:off x="838200" y="2971800"/>
-            <a:ext cx="7924800" cy="2462213"/>
+            <a:off x="609600" y="2914650"/>
+            <a:ext cx="7924800" cy="1908215"/>
           </a:xfrm>
           <a:prstGeom prst="rect">
             <a:avLst/>
@@ -3189,7 +3196,7 @@
             </a:pPr>
             <a:r>
               <a:rPr lang="en-US" dirty="0" smtClean="0"/>
-              <a:t>Vu Minh Tin</a:t>
+              <a:t>Huynh Minh Tin</a:t>
             </a:r>
           </a:p>
           <a:p>
@@ -3228,7 +3235,7 @@
               <a:rPr lang="en-US" dirty="0" err="1" smtClean="0"/>
               <a:t>Phung</a:t>
             </a:r>
-            <a:endParaRPr lang="en-US" dirty="0" smtClean="0"/>
+            <a:endParaRPr lang="en-US" dirty="0"/>
           </a:p>
           <a:p>
             <a:pPr marL="1200150" lvl="2" indent="-285750">
@@ -3237,35 +3244,16 @@
             </a:pPr>
             <a:r>
               <a:rPr lang="en-US" dirty="0" smtClean="0"/>
-              <a:t>Huynh Hoang </a:t>
+              <a:t>Nguyen </a:t>
             </a:r>
             <a:r>
               <a:rPr lang="en-US" dirty="0" err="1" smtClean="0"/>
-              <a:t>Huy</a:t>
-            </a:r>
-            <a:endParaRPr lang="en-US" dirty="0" smtClean="0"/>
-          </a:p>
-          <a:p>
+              <a:t>Huu</a:t>
+            </a:r>
             <a:r>
               <a:rPr lang="en-US" dirty="0" smtClean="0"/>
-              <a:t>	/ home /</a:t>
-            </a:r>
-            <a:r>
-              <a:rPr lang="en-US" dirty="0" err="1" smtClean="0"/>
-              <a:t>sgaydfa</a:t>
-            </a:r>
-            <a:r>
-              <a:rPr lang="en-US" dirty="0" smtClean="0"/>
-              <a:t>/</a:t>
-            </a:r>
-            <a:r>
-              <a:rPr lang="en-US" dirty="0" err="1" smtClean="0"/>
-              <a:t>asdhfjahsdjfh</a:t>
-            </a:r>
-            <a:endParaRPr lang="en-US" dirty="0" smtClean="0"/>
-          </a:p>
-          <a:p>
-            <a:endParaRPr lang="en-US" dirty="0" smtClean="0"/>
+              <a:t> Hung	</a:t>
+            </a:r>
           </a:p>
         </p:txBody>
       </p:sp>
@@ -3327,6 +3315,88 @@
 </file>
 
 <file path=ppt/slides/slide10.xml><?xml version="1.0" encoding="utf-8"?>
+<p:sld xmlns:a="http://schemas.openxmlformats.org/drawingml/2006/main" xmlns:r="http://schemas.openxmlformats.org/officeDocument/2006/relationships" xmlns:p="http://schemas.openxmlformats.org/presentationml/2006/main">
+  <p:cSld>
+    <p:spTree>
+      <p:nvGrpSpPr>
+        <p:cNvPr id="1" name=""/>
+        <p:cNvGrpSpPr/>
+        <p:nvPr/>
+      </p:nvGrpSpPr>
+      <p:grpSpPr>
+        <a:xfrm>
+          <a:off x="0" y="0"/>
+          <a:ext cx="0" cy="0"/>
+          <a:chOff x="0" y="0"/>
+          <a:chExt cx="0" cy="0"/>
+        </a:xfrm>
+      </p:grpSpPr>
+      <p:sp>
+        <p:nvSpPr>
+          <p:cNvPr id="2" name="Title 1"/>
+          <p:cNvSpPr>
+            <a:spLocks noGrp="1"/>
+          </p:cNvSpPr>
+          <p:nvPr>
+            <p:ph type="title"/>
+          </p:nvPr>
+        </p:nvSpPr>
+        <p:spPr/>
+        <p:txBody>
+          <a:bodyPr/>
+          <a:lstStyle/>
+          <a:p>
+            <a:r>
+              <a:rPr lang="en-US" dirty="0" smtClean="0"/>
+              <a:t>DATABASE</a:t>
+            </a:r>
+            <a:endParaRPr lang="en-US" dirty="0"/>
+          </a:p>
+        </p:txBody>
+      </p:sp>
+      <p:pic>
+        <p:nvPicPr>
+          <p:cNvPr id="4" name="Content Placeholder 3"/>
+          <p:cNvPicPr>
+            <a:picLocks noGrp="1" noChangeAspect="1"/>
+          </p:cNvPicPr>
+          <p:nvPr>
+            <p:ph idx="1"/>
+          </p:nvPr>
+        </p:nvPicPr>
+        <p:blipFill>
+          <a:blip r:embed="rId2">
+            <a:extLst>
+              <a:ext uri="{28A0092B-C50C-407E-A947-70E740481C1C}">
+                <a14:useLocalDpi xmlns:a14="http://schemas.microsoft.com/office/drawing/2010/main" val="0"/>
+              </a:ext>
+            </a:extLst>
+          </a:blip>
+          <a:stretch>
+            <a:fillRect/>
+          </a:stretch>
+        </p:blipFill>
+        <p:spPr>
+          <a:xfrm>
+            <a:off x="1447800" y="1295400"/>
+            <a:ext cx="6019800" cy="5334000"/>
+          </a:xfrm>
+        </p:spPr>
+      </p:pic>
+    </p:spTree>
+    <p:extLst>
+      <p:ext uri="{BB962C8B-B14F-4D97-AF65-F5344CB8AC3E}">
+        <p14:creationId xmlns:p14="http://schemas.microsoft.com/office/powerpoint/2010/main" val="310402103"/>
+      </p:ext>
+    </p:extLst>
+  </p:cSld>
+  <p:clrMapOvr>
+    <a:masterClrMapping/>
+  </p:clrMapOvr>
+</p:sld>
+</file>
+
+<file path=ppt/slides/slide11.xml><?xml version="1.0" encoding="utf-8"?>
 <p:sld xmlns:a="http://schemas.openxmlformats.org/drawingml/2006/main" xmlns:r="http://schemas.openxmlformats.org/officeDocument/2006/relationships" xmlns:p="http://schemas.openxmlformats.org/presentationml/2006/main">
   <p:cSld>
     <p:spTree>
@@ -3408,89 +3478,6 @@
 </p:sld>
 </file>
 
-<file path=ppt/slides/slide11.xml><?xml version="1.0" encoding="utf-8"?>
-<p:sld xmlns:a="http://schemas.openxmlformats.org/drawingml/2006/main" xmlns:r="http://schemas.openxmlformats.org/officeDocument/2006/relationships" xmlns:p="http://schemas.openxmlformats.org/presentationml/2006/main">
-  <p:cSld>
-    <p:spTree>
-      <p:nvGrpSpPr>
-        <p:cNvPr id="1" name=""/>
-        <p:cNvGrpSpPr/>
-        <p:nvPr/>
-      </p:nvGrpSpPr>
-      <p:grpSpPr>
-        <a:xfrm>
-          <a:off x="0" y="0"/>
-          <a:ext cx="0" cy="0"/>
-          <a:chOff x="0" y="0"/>
-          <a:chExt cx="0" cy="0"/>
-        </a:xfrm>
-      </p:grpSpPr>
-      <p:sp>
-        <p:nvSpPr>
-          <p:cNvPr id="2" name="Title 1"/>
-          <p:cNvSpPr>
-            <a:spLocks noGrp="1"/>
-          </p:cNvSpPr>
-          <p:nvPr>
-            <p:ph type="title"/>
-          </p:nvPr>
-        </p:nvSpPr>
-        <p:spPr/>
-        <p:txBody>
-          <a:bodyPr/>
-          <a:lstStyle/>
-          <a:p>
-            <a:r>
-              <a:rPr lang="en-US" dirty="0" err="1" smtClean="0"/>
-              <a:t>Fornt</a:t>
-            </a:r>
-            <a:r>
-              <a:rPr lang="en-US" dirty="0" smtClean="0"/>
-              <a:t> end</a:t>
-            </a:r>
-            <a:endParaRPr lang="en-US" dirty="0"/>
-          </a:p>
-        </p:txBody>
-      </p:sp>
-      <p:sp>
-        <p:nvSpPr>
-          <p:cNvPr id="3" name="Content Placeholder 2"/>
-          <p:cNvSpPr>
-            <a:spLocks noGrp="1"/>
-          </p:cNvSpPr>
-          <p:nvPr>
-            <p:ph idx="1"/>
-          </p:nvPr>
-        </p:nvSpPr>
-        <p:spPr/>
-        <p:txBody>
-          <a:bodyPr/>
-          <a:lstStyle/>
-          <a:p>
-            <a:pPr marL="0" indent="0">
-              <a:buNone/>
-            </a:pPr>
-            <a:r>
-              <a:rPr lang="en-US" smtClean="0"/>
-              <a:t>User:</a:t>
-            </a:r>
-            <a:endParaRPr lang="en-US" dirty="0"/>
-          </a:p>
-        </p:txBody>
-      </p:sp>
-    </p:spTree>
-    <p:extLst>
-      <p:ext uri="{BB962C8B-B14F-4D97-AF65-F5344CB8AC3E}">
-        <p14:creationId xmlns:p14="http://schemas.microsoft.com/office/powerpoint/2010/main" val="3544587721"/>
-      </p:ext>
-    </p:extLst>
-  </p:cSld>
-  <p:clrMapOvr>
-    <a:masterClrMapping/>
-  </p:clrMapOvr>
-</p:sld>
-</file>
-
 <file path=ppt/slides/slide12.xml><?xml version="1.0" encoding="utf-8"?>
 <p:sld xmlns:a="http://schemas.openxmlformats.org/drawingml/2006/main" xmlns:r="http://schemas.openxmlformats.org/officeDocument/2006/relationships" xmlns:p="http://schemas.openxmlformats.org/presentationml/2006/main">
   <p:cSld>
@@ -3525,7 +3512,7 @@
           <a:p>
             <a:r>
               <a:rPr lang="en-US" dirty="0" smtClean="0"/>
-              <a:t>Back end</a:t>
+              <a:t>Flow for MFS</a:t>
             </a:r>
             <a:endParaRPr lang="en-US" dirty="0"/>
           </a:p>
@@ -3533,6 +3520,683 @@
       </p:sp>
       <p:sp>
         <p:nvSpPr>
+          <p:cNvPr id="4" name="Content Placeholder 3"/>
+          <p:cNvSpPr>
+            <a:spLocks noGrp="1"/>
+          </p:cNvSpPr>
+          <p:nvPr>
+            <p:ph idx="1"/>
+          </p:nvPr>
+        </p:nvSpPr>
+        <p:spPr/>
+        <p:txBody>
+          <a:bodyPr/>
+          <a:lstStyle/>
+          <a:p>
+            <a:r>
+              <a:rPr lang="en-US" dirty="0" smtClean="0"/>
+              <a:t>Guest</a:t>
+            </a:r>
+          </a:p>
+          <a:p>
+            <a:endParaRPr lang="en-US" dirty="0"/>
+          </a:p>
+        </p:txBody>
+      </p:sp>
+      <p:pic>
+        <p:nvPicPr>
+          <p:cNvPr id="1028" name="Picture 4"/>
+          <p:cNvPicPr>
+            <a:picLocks noChangeAspect="1" noChangeArrowheads="1"/>
+          </p:cNvPicPr>
+          <p:nvPr/>
+        </p:nvPicPr>
+        <p:blipFill>
+          <a:blip r:embed="rId2">
+            <a:extLst>
+              <a:ext uri="{28A0092B-C50C-407E-A947-70E740481C1C}">
+                <a14:useLocalDpi xmlns:a14="http://schemas.microsoft.com/office/drawing/2010/main" val="0"/>
+              </a:ext>
+            </a:extLst>
+          </a:blip>
+          <a:srcRect/>
+          <a:stretch>
+            <a:fillRect/>
+          </a:stretch>
+        </p:blipFill>
+        <p:spPr bwMode="auto">
+          <a:xfrm>
+            <a:off x="609600" y="2133600"/>
+            <a:ext cx="8153400" cy="4191000"/>
+          </a:xfrm>
+          <a:prstGeom prst="rect">
+            <a:avLst/>
+          </a:prstGeom>
+          <a:noFill/>
+          <a:ln>
+            <a:noFill/>
+          </a:ln>
+          <a:extLst>
+            <a:ext uri="{909E8E84-426E-40DD-AFC4-6F175D3DCCD1}">
+              <a14:hiddenFill xmlns:a14="http://schemas.microsoft.com/office/drawing/2010/main">
+                <a:solidFill>
+                  <a:schemeClr val="accent1"/>
+                </a:solidFill>
+              </a14:hiddenFill>
+            </a:ext>
+            <a:ext uri="{91240B29-F687-4F45-9708-019B960494DF}">
+              <a14:hiddenLine xmlns:a14="http://schemas.microsoft.com/office/drawing/2010/main" w="9525">
+                <a:solidFill>
+                  <a:schemeClr val="tx1"/>
+                </a:solidFill>
+                <a:miter lim="800000"/>
+                <a:headEnd/>
+                <a:tailEnd/>
+              </a14:hiddenLine>
+            </a:ext>
+          </a:extLst>
+        </p:spPr>
+      </p:pic>
+    </p:spTree>
+    <p:extLst>
+      <p:ext uri="{BB962C8B-B14F-4D97-AF65-F5344CB8AC3E}">
+        <p14:creationId xmlns:p14="http://schemas.microsoft.com/office/powerpoint/2010/main" val="3544587721"/>
+      </p:ext>
+    </p:extLst>
+  </p:cSld>
+  <p:clrMapOvr>
+    <a:masterClrMapping/>
+  </p:clrMapOvr>
+</p:sld>
+</file>
+
+<file path=ppt/slides/slide13.xml><?xml version="1.0" encoding="utf-8"?>
+<p:sld xmlns:a="http://schemas.openxmlformats.org/drawingml/2006/main" xmlns:r="http://schemas.openxmlformats.org/officeDocument/2006/relationships" xmlns:p="http://schemas.openxmlformats.org/presentationml/2006/main">
+  <p:cSld>
+    <p:spTree>
+      <p:nvGrpSpPr>
+        <p:cNvPr id="1" name=""/>
+        <p:cNvGrpSpPr/>
+        <p:nvPr/>
+      </p:nvGrpSpPr>
+      <p:grpSpPr>
+        <a:xfrm>
+          <a:off x="0" y="0"/>
+          <a:ext cx="0" cy="0"/>
+          <a:chOff x="0" y="0"/>
+          <a:chExt cx="0" cy="0"/>
+        </a:xfrm>
+      </p:grpSpPr>
+      <p:sp>
+        <p:nvSpPr>
+          <p:cNvPr id="2" name="Title 1"/>
+          <p:cNvSpPr>
+            <a:spLocks noGrp="1"/>
+          </p:cNvSpPr>
+          <p:nvPr>
+            <p:ph type="title"/>
+          </p:nvPr>
+        </p:nvSpPr>
+        <p:spPr/>
+        <p:txBody>
+          <a:bodyPr/>
+          <a:lstStyle/>
+          <a:p>
+            <a:r>
+              <a:rPr lang="en-US" dirty="0" smtClean="0"/>
+              <a:t>Login Page</a:t>
+            </a:r>
+            <a:endParaRPr lang="en-US" dirty="0"/>
+          </a:p>
+        </p:txBody>
+      </p:sp>
+      <p:pic>
+        <p:nvPicPr>
+          <p:cNvPr id="2050" name="Picture 2"/>
+          <p:cNvPicPr>
+            <a:picLocks noGrp="1" noChangeAspect="1" noChangeArrowheads="1"/>
+          </p:cNvPicPr>
+          <p:nvPr>
+            <p:ph idx="1"/>
+          </p:nvPr>
+        </p:nvPicPr>
+        <p:blipFill>
+          <a:blip r:embed="rId2">
+            <a:extLst>
+              <a:ext uri="{28A0092B-C50C-407E-A947-70E740481C1C}">
+                <a14:useLocalDpi xmlns:a14="http://schemas.microsoft.com/office/drawing/2010/main" val="0"/>
+              </a:ext>
+            </a:extLst>
+          </a:blip>
+          <a:srcRect/>
+          <a:stretch>
+            <a:fillRect/>
+          </a:stretch>
+        </p:blipFill>
+        <p:spPr bwMode="auto">
+          <a:xfrm>
+            <a:off x="1743273" y="1600200"/>
+            <a:ext cx="5657453" cy="4525963"/>
+          </a:xfrm>
+          <a:prstGeom prst="rect">
+            <a:avLst/>
+          </a:prstGeom>
+          <a:noFill/>
+          <a:ln>
+            <a:noFill/>
+          </a:ln>
+          <a:extLst>
+            <a:ext uri="{909E8E84-426E-40DD-AFC4-6F175D3DCCD1}">
+              <a14:hiddenFill xmlns:a14="http://schemas.microsoft.com/office/drawing/2010/main">
+                <a:solidFill>
+                  <a:schemeClr val="accent1"/>
+                </a:solidFill>
+              </a14:hiddenFill>
+            </a:ext>
+            <a:ext uri="{91240B29-F687-4F45-9708-019B960494DF}">
+              <a14:hiddenLine xmlns:a14="http://schemas.microsoft.com/office/drawing/2010/main" w="9525">
+                <a:solidFill>
+                  <a:schemeClr val="tx1"/>
+                </a:solidFill>
+                <a:miter lim="800000"/>
+                <a:headEnd/>
+                <a:tailEnd/>
+              </a14:hiddenLine>
+            </a:ext>
+          </a:extLst>
+        </p:spPr>
+      </p:pic>
+    </p:spTree>
+    <p:extLst>
+      <p:ext uri="{BB962C8B-B14F-4D97-AF65-F5344CB8AC3E}">
+        <p14:creationId xmlns:p14="http://schemas.microsoft.com/office/powerpoint/2010/main" val="442683732"/>
+      </p:ext>
+    </p:extLst>
+  </p:cSld>
+  <p:clrMapOvr>
+    <a:masterClrMapping/>
+  </p:clrMapOvr>
+</p:sld>
+</file>
+
+<file path=ppt/slides/slide14.xml><?xml version="1.0" encoding="utf-8"?>
+<p:sld xmlns:a="http://schemas.openxmlformats.org/drawingml/2006/main" xmlns:r="http://schemas.openxmlformats.org/officeDocument/2006/relationships" xmlns:p="http://schemas.openxmlformats.org/presentationml/2006/main">
+  <p:cSld>
+    <p:spTree>
+      <p:nvGrpSpPr>
+        <p:cNvPr id="1" name=""/>
+        <p:cNvGrpSpPr/>
+        <p:nvPr/>
+      </p:nvGrpSpPr>
+      <p:grpSpPr>
+        <a:xfrm>
+          <a:off x="0" y="0"/>
+          <a:ext cx="0" cy="0"/>
+          <a:chOff x="0" y="0"/>
+          <a:chExt cx="0" cy="0"/>
+        </a:xfrm>
+      </p:grpSpPr>
+      <p:sp>
+        <p:nvSpPr>
+          <p:cNvPr id="2" name="Title 1"/>
+          <p:cNvSpPr>
+            <a:spLocks noGrp="1"/>
+          </p:cNvSpPr>
+          <p:nvPr>
+            <p:ph type="title"/>
+          </p:nvPr>
+        </p:nvSpPr>
+        <p:spPr/>
+        <p:txBody>
+          <a:bodyPr/>
+          <a:lstStyle/>
+          <a:p>
+            <a:r>
+              <a:rPr lang="en-US" dirty="0" smtClean="0"/>
+              <a:t>Register Page</a:t>
+            </a:r>
+            <a:endParaRPr lang="en-US" dirty="0"/>
+          </a:p>
+        </p:txBody>
+      </p:sp>
+      <p:pic>
+        <p:nvPicPr>
+          <p:cNvPr id="3074" name="Picture 2"/>
+          <p:cNvPicPr>
+            <a:picLocks noGrp="1" noChangeAspect="1" noChangeArrowheads="1"/>
+          </p:cNvPicPr>
+          <p:nvPr>
+            <p:ph idx="1"/>
+          </p:nvPr>
+        </p:nvPicPr>
+        <p:blipFill>
+          <a:blip r:embed="rId2">
+            <a:extLst>
+              <a:ext uri="{28A0092B-C50C-407E-A947-70E740481C1C}">
+                <a14:useLocalDpi xmlns:a14="http://schemas.microsoft.com/office/drawing/2010/main" val="0"/>
+              </a:ext>
+            </a:extLst>
+          </a:blip>
+          <a:srcRect/>
+          <a:stretch>
+            <a:fillRect/>
+          </a:stretch>
+        </p:blipFill>
+        <p:spPr bwMode="auto">
+          <a:xfrm>
+            <a:off x="1743273" y="1600200"/>
+            <a:ext cx="5657453" cy="4525963"/>
+          </a:xfrm>
+          <a:prstGeom prst="rect">
+            <a:avLst/>
+          </a:prstGeom>
+          <a:noFill/>
+          <a:ln>
+            <a:noFill/>
+          </a:ln>
+          <a:extLst>
+            <a:ext uri="{909E8E84-426E-40DD-AFC4-6F175D3DCCD1}">
+              <a14:hiddenFill xmlns:a14="http://schemas.microsoft.com/office/drawing/2010/main">
+                <a:solidFill>
+                  <a:schemeClr val="accent1"/>
+                </a:solidFill>
+              </a14:hiddenFill>
+            </a:ext>
+            <a:ext uri="{91240B29-F687-4F45-9708-019B960494DF}">
+              <a14:hiddenLine xmlns:a14="http://schemas.microsoft.com/office/drawing/2010/main" w="9525">
+                <a:solidFill>
+                  <a:schemeClr val="tx1"/>
+                </a:solidFill>
+                <a:miter lim="800000"/>
+                <a:headEnd/>
+                <a:tailEnd/>
+              </a14:hiddenLine>
+            </a:ext>
+          </a:extLst>
+        </p:spPr>
+      </p:pic>
+    </p:spTree>
+    <p:extLst>
+      <p:ext uri="{BB962C8B-B14F-4D97-AF65-F5344CB8AC3E}">
+        <p14:creationId xmlns:p14="http://schemas.microsoft.com/office/powerpoint/2010/main" val="1460071311"/>
+      </p:ext>
+    </p:extLst>
+  </p:cSld>
+  <p:clrMapOvr>
+    <a:masterClrMapping/>
+  </p:clrMapOvr>
+</p:sld>
+</file>
+
+<file path=ppt/slides/slide15.xml><?xml version="1.0" encoding="utf-8"?>
+<p:sld xmlns:a="http://schemas.openxmlformats.org/drawingml/2006/main" xmlns:r="http://schemas.openxmlformats.org/officeDocument/2006/relationships" xmlns:p="http://schemas.openxmlformats.org/presentationml/2006/main">
+  <p:cSld>
+    <p:spTree>
+      <p:nvGrpSpPr>
+        <p:cNvPr id="1" name=""/>
+        <p:cNvGrpSpPr/>
+        <p:nvPr/>
+      </p:nvGrpSpPr>
+      <p:grpSpPr>
+        <a:xfrm>
+          <a:off x="0" y="0"/>
+          <a:ext cx="0" cy="0"/>
+          <a:chOff x="0" y="0"/>
+          <a:chExt cx="0" cy="0"/>
+        </a:xfrm>
+      </p:grpSpPr>
+      <p:sp>
+        <p:nvSpPr>
+          <p:cNvPr id="2" name="Title 1"/>
+          <p:cNvSpPr>
+            <a:spLocks noGrp="1"/>
+          </p:cNvSpPr>
+          <p:nvPr>
+            <p:ph type="title"/>
+          </p:nvPr>
+        </p:nvSpPr>
+        <p:spPr/>
+        <p:txBody>
+          <a:bodyPr/>
+          <a:lstStyle/>
+          <a:p>
+            <a:r>
+              <a:rPr lang="en-US" dirty="0" smtClean="0"/>
+              <a:t>Admin Page</a:t>
+            </a:r>
+            <a:endParaRPr lang="en-US" dirty="0"/>
+          </a:p>
+        </p:txBody>
+      </p:sp>
+      <p:pic>
+        <p:nvPicPr>
+          <p:cNvPr id="4098" name="Picture 2"/>
+          <p:cNvPicPr>
+            <a:picLocks noGrp="1" noChangeAspect="1" noChangeArrowheads="1"/>
+          </p:cNvPicPr>
+          <p:nvPr>
+            <p:ph idx="1"/>
+          </p:nvPr>
+        </p:nvPicPr>
+        <p:blipFill>
+          <a:blip r:embed="rId2">
+            <a:extLst>
+              <a:ext uri="{28A0092B-C50C-407E-A947-70E740481C1C}">
+                <a14:useLocalDpi xmlns:a14="http://schemas.microsoft.com/office/drawing/2010/main" val="0"/>
+              </a:ext>
+            </a:extLst>
+          </a:blip>
+          <a:srcRect/>
+          <a:stretch>
+            <a:fillRect/>
+          </a:stretch>
+        </p:blipFill>
+        <p:spPr bwMode="auto">
+          <a:xfrm>
+            <a:off x="1743273" y="1600200"/>
+            <a:ext cx="5657453" cy="4525963"/>
+          </a:xfrm>
+          <a:prstGeom prst="rect">
+            <a:avLst/>
+          </a:prstGeom>
+          <a:noFill/>
+          <a:ln>
+            <a:noFill/>
+          </a:ln>
+          <a:extLst>
+            <a:ext uri="{909E8E84-426E-40DD-AFC4-6F175D3DCCD1}">
+              <a14:hiddenFill xmlns:a14="http://schemas.microsoft.com/office/drawing/2010/main">
+                <a:solidFill>
+                  <a:schemeClr val="accent1"/>
+                </a:solidFill>
+              </a14:hiddenFill>
+            </a:ext>
+            <a:ext uri="{91240B29-F687-4F45-9708-019B960494DF}">
+              <a14:hiddenLine xmlns:a14="http://schemas.microsoft.com/office/drawing/2010/main" w="9525">
+                <a:solidFill>
+                  <a:schemeClr val="tx1"/>
+                </a:solidFill>
+                <a:miter lim="800000"/>
+                <a:headEnd/>
+                <a:tailEnd/>
+              </a14:hiddenLine>
+            </a:ext>
+          </a:extLst>
+        </p:spPr>
+      </p:pic>
+    </p:spTree>
+    <p:extLst>
+      <p:ext uri="{BB962C8B-B14F-4D97-AF65-F5344CB8AC3E}">
+        <p14:creationId xmlns:p14="http://schemas.microsoft.com/office/powerpoint/2010/main" val="3967005935"/>
+      </p:ext>
+    </p:extLst>
+  </p:cSld>
+  <p:clrMapOvr>
+    <a:masterClrMapping/>
+  </p:clrMapOvr>
+</p:sld>
+</file>
+
+<file path=ppt/slides/slide16.xml><?xml version="1.0" encoding="utf-8"?>
+<p:sld xmlns:a="http://schemas.openxmlformats.org/drawingml/2006/main" xmlns:r="http://schemas.openxmlformats.org/officeDocument/2006/relationships" xmlns:p="http://schemas.openxmlformats.org/presentationml/2006/main">
+  <p:cSld>
+    <p:spTree>
+      <p:nvGrpSpPr>
+        <p:cNvPr id="1" name=""/>
+        <p:cNvGrpSpPr/>
+        <p:nvPr/>
+      </p:nvGrpSpPr>
+      <p:grpSpPr>
+        <a:xfrm>
+          <a:off x="0" y="0"/>
+          <a:ext cx="0" cy="0"/>
+          <a:chOff x="0" y="0"/>
+          <a:chExt cx="0" cy="0"/>
+        </a:xfrm>
+      </p:grpSpPr>
+      <p:sp>
+        <p:nvSpPr>
+          <p:cNvPr id="2" name="Title 1"/>
+          <p:cNvSpPr>
+            <a:spLocks noGrp="1"/>
+          </p:cNvSpPr>
+          <p:nvPr>
+            <p:ph type="title"/>
+          </p:nvPr>
+        </p:nvSpPr>
+        <p:spPr/>
+        <p:txBody>
+          <a:bodyPr/>
+          <a:lstStyle/>
+          <a:p>
+            <a:r>
+              <a:rPr lang="en-US" dirty="0" smtClean="0"/>
+              <a:t>User Page</a:t>
+            </a:r>
+            <a:endParaRPr lang="en-US" dirty="0"/>
+          </a:p>
+        </p:txBody>
+      </p:sp>
+      <p:pic>
+        <p:nvPicPr>
+          <p:cNvPr id="5122" name="Picture 2"/>
+          <p:cNvPicPr>
+            <a:picLocks noGrp="1" noChangeAspect="1" noChangeArrowheads="1"/>
+          </p:cNvPicPr>
+          <p:nvPr>
+            <p:ph idx="1"/>
+          </p:nvPr>
+        </p:nvPicPr>
+        <p:blipFill>
+          <a:blip r:embed="rId2">
+            <a:extLst>
+              <a:ext uri="{28A0092B-C50C-407E-A947-70E740481C1C}">
+                <a14:useLocalDpi xmlns:a14="http://schemas.microsoft.com/office/drawing/2010/main" val="0"/>
+              </a:ext>
+            </a:extLst>
+          </a:blip>
+          <a:srcRect/>
+          <a:stretch>
+            <a:fillRect/>
+          </a:stretch>
+        </p:blipFill>
+        <p:spPr bwMode="auto">
+          <a:xfrm>
+            <a:off x="1743273" y="1600200"/>
+            <a:ext cx="5657453" cy="4525963"/>
+          </a:xfrm>
+          <a:prstGeom prst="rect">
+            <a:avLst/>
+          </a:prstGeom>
+          <a:noFill/>
+          <a:ln>
+            <a:noFill/>
+          </a:ln>
+          <a:extLst>
+            <a:ext uri="{909E8E84-426E-40DD-AFC4-6F175D3DCCD1}">
+              <a14:hiddenFill xmlns:a14="http://schemas.microsoft.com/office/drawing/2010/main">
+                <a:solidFill>
+                  <a:schemeClr val="accent1"/>
+                </a:solidFill>
+              </a14:hiddenFill>
+            </a:ext>
+            <a:ext uri="{91240B29-F687-4F45-9708-019B960494DF}">
+              <a14:hiddenLine xmlns:a14="http://schemas.microsoft.com/office/drawing/2010/main" w="9525">
+                <a:solidFill>
+                  <a:schemeClr val="tx1"/>
+                </a:solidFill>
+                <a:miter lim="800000"/>
+                <a:headEnd/>
+                <a:tailEnd/>
+              </a14:hiddenLine>
+            </a:ext>
+          </a:extLst>
+        </p:spPr>
+      </p:pic>
+    </p:spTree>
+    <p:extLst>
+      <p:ext uri="{BB962C8B-B14F-4D97-AF65-F5344CB8AC3E}">
+        <p14:creationId xmlns:p14="http://schemas.microsoft.com/office/powerpoint/2010/main" val="3971176853"/>
+      </p:ext>
+    </p:extLst>
+  </p:cSld>
+  <p:clrMapOvr>
+    <a:masterClrMapping/>
+  </p:clrMapOvr>
+</p:sld>
+</file>
+
+<file path=ppt/slides/slide17.xml><?xml version="1.0" encoding="utf-8"?>
+<p:sld xmlns:a="http://schemas.openxmlformats.org/drawingml/2006/main" xmlns:r="http://schemas.openxmlformats.org/officeDocument/2006/relationships" xmlns:p="http://schemas.openxmlformats.org/presentationml/2006/main">
+  <p:cSld>
+    <p:spTree>
+      <p:nvGrpSpPr>
+        <p:cNvPr id="1" name=""/>
+        <p:cNvGrpSpPr/>
+        <p:nvPr/>
+      </p:nvGrpSpPr>
+      <p:grpSpPr>
+        <a:xfrm>
+          <a:off x="0" y="0"/>
+          <a:ext cx="0" cy="0"/>
+          <a:chOff x="0" y="0"/>
+          <a:chExt cx="0" cy="0"/>
+        </a:xfrm>
+      </p:grpSpPr>
+      <p:sp>
+        <p:nvSpPr>
+          <p:cNvPr id="2" name="Title 1"/>
+          <p:cNvSpPr>
+            <a:spLocks noGrp="1"/>
+          </p:cNvSpPr>
+          <p:nvPr>
+            <p:ph type="title"/>
+          </p:nvPr>
+        </p:nvSpPr>
+        <p:spPr/>
+        <p:txBody>
+          <a:bodyPr/>
+          <a:lstStyle/>
+          <a:p>
+            <a:r>
+              <a:rPr lang="en-US" dirty="0" err="1" smtClean="0"/>
+              <a:t>DownLoad</a:t>
+            </a:r>
+            <a:r>
+              <a:rPr lang="en-US" dirty="0" smtClean="0"/>
+              <a:t> Page</a:t>
+            </a:r>
+            <a:endParaRPr lang="en-US" dirty="0"/>
+          </a:p>
+        </p:txBody>
+      </p:sp>
+      <p:pic>
+        <p:nvPicPr>
+          <p:cNvPr id="6146" name="Picture 2"/>
+          <p:cNvPicPr>
+            <a:picLocks noGrp="1" noChangeAspect="1" noChangeArrowheads="1"/>
+          </p:cNvPicPr>
+          <p:nvPr>
+            <p:ph idx="1"/>
+          </p:nvPr>
+        </p:nvPicPr>
+        <p:blipFill>
+          <a:blip r:embed="rId2">
+            <a:extLst>
+              <a:ext uri="{28A0092B-C50C-407E-A947-70E740481C1C}">
+                <a14:useLocalDpi xmlns:a14="http://schemas.microsoft.com/office/drawing/2010/main" val="0"/>
+              </a:ext>
+            </a:extLst>
+          </a:blip>
+          <a:srcRect/>
+          <a:stretch>
+            <a:fillRect/>
+          </a:stretch>
+        </p:blipFill>
+        <p:spPr bwMode="auto">
+          <a:xfrm>
+            <a:off x="1743273" y="1600200"/>
+            <a:ext cx="5657453" cy="4525963"/>
+          </a:xfrm>
+          <a:prstGeom prst="rect">
+            <a:avLst/>
+          </a:prstGeom>
+          <a:noFill/>
+          <a:ln>
+            <a:noFill/>
+          </a:ln>
+          <a:extLst>
+            <a:ext uri="{909E8E84-426E-40DD-AFC4-6F175D3DCCD1}">
+              <a14:hiddenFill xmlns:a14="http://schemas.microsoft.com/office/drawing/2010/main">
+                <a:solidFill>
+                  <a:schemeClr val="accent1"/>
+                </a:solidFill>
+              </a14:hiddenFill>
+            </a:ext>
+            <a:ext uri="{91240B29-F687-4F45-9708-019B960494DF}">
+              <a14:hiddenLine xmlns:a14="http://schemas.microsoft.com/office/drawing/2010/main" w="9525">
+                <a:solidFill>
+                  <a:schemeClr val="tx1"/>
+                </a:solidFill>
+                <a:miter lim="800000"/>
+                <a:headEnd/>
+                <a:tailEnd/>
+              </a14:hiddenLine>
+            </a:ext>
+          </a:extLst>
+        </p:spPr>
+      </p:pic>
+    </p:spTree>
+    <p:extLst>
+      <p:ext uri="{BB962C8B-B14F-4D97-AF65-F5344CB8AC3E}">
+        <p14:creationId xmlns:p14="http://schemas.microsoft.com/office/powerpoint/2010/main" val="811247894"/>
+      </p:ext>
+    </p:extLst>
+  </p:cSld>
+  <p:clrMapOvr>
+    <a:masterClrMapping/>
+  </p:clrMapOvr>
+</p:sld>
+</file>
+
+<file path=ppt/slides/slide18.xml><?xml version="1.0" encoding="utf-8"?>
+<p:sld xmlns:a="http://schemas.openxmlformats.org/drawingml/2006/main" xmlns:r="http://schemas.openxmlformats.org/officeDocument/2006/relationships" xmlns:p="http://schemas.openxmlformats.org/presentationml/2006/main">
+  <p:cSld>
+    <p:spTree>
+      <p:nvGrpSpPr>
+        <p:cNvPr id="1" name=""/>
+        <p:cNvGrpSpPr/>
+        <p:nvPr/>
+      </p:nvGrpSpPr>
+      <p:grpSpPr>
+        <a:xfrm>
+          <a:off x="0" y="0"/>
+          <a:ext cx="0" cy="0"/>
+          <a:chOff x="0" y="0"/>
+          <a:chExt cx="0" cy="0"/>
+        </a:xfrm>
+      </p:grpSpPr>
+      <p:sp>
+        <p:nvSpPr>
+          <p:cNvPr id="2" name="Title 1"/>
+          <p:cNvSpPr>
+            <a:spLocks noGrp="1"/>
+          </p:cNvSpPr>
+          <p:nvPr>
+            <p:ph type="title"/>
+          </p:nvPr>
+        </p:nvSpPr>
+        <p:spPr/>
+        <p:txBody>
+          <a:bodyPr/>
+          <a:lstStyle/>
+          <a:p>
+            <a:endParaRPr lang="en-US" dirty="0"/>
+          </a:p>
+        </p:txBody>
+      </p:sp>
+      <p:sp>
+        <p:nvSpPr>
           <p:cNvPr id="3" name="Content Placeholder 2"/>
           <p:cNvSpPr>
             <a:spLocks noGrp="1"/>
@@ -3543,10 +4207,92 @@
         </p:nvSpPr>
         <p:spPr/>
         <p:txBody>
-          <a:bodyPr/>
-          <a:lstStyle/>
-          <a:p>
-            <a:endParaRPr lang="en-US"/>
+          <a:bodyPr>
+            <a:normAutofit/>
+          </a:bodyPr>
+          <a:lstStyle/>
+          <a:p>
+            <a:pPr algn="ctr"/>
+            <a:r>
+              <a:rPr lang="en-US" sz="4800" dirty="0" smtClean="0"/>
+              <a:t>DEMO</a:t>
+            </a:r>
+            <a:endParaRPr lang="en-US" sz="4800" dirty="0"/>
+          </a:p>
+        </p:txBody>
+      </p:sp>
+    </p:spTree>
+    <p:extLst>
+      <p:ext uri="{BB962C8B-B14F-4D97-AF65-F5344CB8AC3E}">
+        <p14:creationId xmlns:p14="http://schemas.microsoft.com/office/powerpoint/2010/main" val="214854221"/>
+      </p:ext>
+    </p:extLst>
+  </p:cSld>
+  <p:clrMapOvr>
+    <a:masterClrMapping/>
+  </p:clrMapOvr>
+</p:sld>
+</file>
+
+<file path=ppt/slides/slide19.xml><?xml version="1.0" encoding="utf-8"?>
+<p:sld xmlns:a="http://schemas.openxmlformats.org/drawingml/2006/main" xmlns:r="http://schemas.openxmlformats.org/officeDocument/2006/relationships" xmlns:p="http://schemas.openxmlformats.org/presentationml/2006/main">
+  <p:cSld>
+    <p:spTree>
+      <p:nvGrpSpPr>
+        <p:cNvPr id="1" name=""/>
+        <p:cNvGrpSpPr/>
+        <p:nvPr/>
+      </p:nvGrpSpPr>
+      <p:grpSpPr>
+        <a:xfrm>
+          <a:off x="0" y="0"/>
+          <a:ext cx="0" cy="0"/>
+          <a:chOff x="0" y="0"/>
+          <a:chExt cx="0" cy="0"/>
+        </a:xfrm>
+      </p:grpSpPr>
+      <p:sp>
+        <p:nvSpPr>
+          <p:cNvPr id="2" name="Title 1"/>
+          <p:cNvSpPr>
+            <a:spLocks noGrp="1"/>
+          </p:cNvSpPr>
+          <p:nvPr>
+            <p:ph type="title"/>
+          </p:nvPr>
+        </p:nvSpPr>
+        <p:spPr/>
+        <p:txBody>
+          <a:bodyPr/>
+          <a:lstStyle/>
+          <a:p>
+            <a:endParaRPr lang="en-US" dirty="0"/>
+          </a:p>
+        </p:txBody>
+      </p:sp>
+      <p:sp>
+        <p:nvSpPr>
+          <p:cNvPr id="3" name="Content Placeholder 2"/>
+          <p:cNvSpPr>
+            <a:spLocks noGrp="1"/>
+          </p:cNvSpPr>
+          <p:nvPr>
+            <p:ph idx="1"/>
+          </p:nvPr>
+        </p:nvSpPr>
+        <p:spPr/>
+        <p:txBody>
+          <a:bodyPr>
+            <a:normAutofit/>
+          </a:bodyPr>
+          <a:lstStyle/>
+          <a:p>
+            <a:pPr algn="ctr"/>
+            <a:r>
+              <a:rPr lang="en-US" sz="4800" dirty="0" smtClean="0"/>
+              <a:t>Thanks for Watching</a:t>
+            </a:r>
+            <a:endParaRPr lang="en-US" sz="4800" dirty="0"/>
           </a:p>
         </p:txBody>
       </p:sp>
@@ -3634,7 +4380,34 @@
             </a:r>
             <a:r>
               <a:rPr lang="en-US" dirty="0"/>
-              <a:t>MFS is a web application which allows user to share their file to the other over the internet. Users are required to register and login if they want to upload or download any file from MFS. Guest user could browse file by category, size or uploader but cannot download any file from MFS.</a:t>
+              <a:t>MFS is a web application which allows user to share their file to the other over the internet. </a:t>
+            </a:r>
+            <a:endParaRPr lang="en-US" dirty="0" smtClean="0"/>
+          </a:p>
+          <a:p>
+            <a:pPr marL="457200" lvl="1" indent="-457200"/>
+            <a:r>
+              <a:rPr lang="en-US" dirty="0" smtClean="0"/>
+              <a:t>Users </a:t>
+            </a:r>
+            <a:r>
+              <a:rPr lang="en-US" dirty="0"/>
+              <a:t>are required to register and login if they want to upload or download any file from MFS</a:t>
+            </a:r>
+            <a:r>
+              <a:rPr lang="en-US" dirty="0" smtClean="0"/>
+              <a:t>.</a:t>
+            </a:r>
+          </a:p>
+          <a:p>
+            <a:pPr marL="457200" lvl="1" indent="-457200"/>
+            <a:r>
+              <a:rPr lang="en-US" dirty="0" smtClean="0"/>
+              <a:t> </a:t>
+            </a:r>
+            <a:r>
+              <a:rPr lang="en-US" dirty="0"/>
+              <a:t>Guest user could browse file by category, size or uploader but cannot download any file from MFS.</a:t>
             </a:r>
           </a:p>
           <a:p>
@@ -4520,45 +5293,108 @@
           <a:p>
             <a:r>
               <a:rPr lang="en-US" dirty="0" smtClean="0"/>
-              <a:t>DATABASE</a:t>
+              <a:t>Technical Using	</a:t>
             </a:r>
             <a:endParaRPr lang="en-US" dirty="0"/>
           </a:p>
         </p:txBody>
       </p:sp>
-      <p:pic>
-        <p:nvPicPr>
-          <p:cNvPr id="4" name="Content Placeholder 3"/>
-          <p:cNvPicPr>
-            <a:picLocks noGrp="1" noChangeAspect="1"/>
-          </p:cNvPicPr>
+      <p:sp>
+        <p:nvSpPr>
+          <p:cNvPr id="3" name="Content Placeholder 2"/>
+          <p:cNvSpPr>
+            <a:spLocks noGrp="1"/>
+          </p:cNvSpPr>
           <p:nvPr>
             <p:ph idx="1"/>
           </p:nvPr>
-        </p:nvPicPr>
-        <p:blipFill>
-          <a:blip r:embed="rId2">
-            <a:extLst>
-              <a:ext uri="{28A0092B-C50C-407E-A947-70E740481C1C}">
-                <a14:useLocalDpi xmlns:a14="http://schemas.microsoft.com/office/drawing/2010/main" val="0"/>
-              </a:ext>
-            </a:extLst>
-          </a:blip>
-          <a:stretch>
-            <a:fillRect/>
-          </a:stretch>
-        </p:blipFill>
-        <p:spPr>
-          <a:xfrm>
-            <a:off x="1981200" y="1600200"/>
-            <a:ext cx="4260269" cy="4525963"/>
-          </a:xfrm>
-        </p:spPr>
-      </p:pic>
+        </p:nvSpPr>
+        <p:spPr/>
+        <p:txBody>
+          <a:bodyPr/>
+          <a:lstStyle/>
+          <a:p>
+            <a:r>
+              <a:rPr lang="en-US" dirty="0" err="1" smtClean="0"/>
+              <a:t>Framwork</a:t>
+            </a:r>
+            <a:r>
+              <a:rPr lang="en-US" dirty="0" smtClean="0"/>
+              <a:t>: Spring MVC, Hibernate.</a:t>
+            </a:r>
+          </a:p>
+          <a:p>
+            <a:r>
+              <a:rPr lang="en-US" dirty="0" smtClean="0"/>
+              <a:t>Client side: JSP, </a:t>
+            </a:r>
+            <a:r>
+              <a:rPr lang="en-US" dirty="0" err="1" smtClean="0"/>
+              <a:t>Boostrap</a:t>
+            </a:r>
+            <a:r>
+              <a:rPr lang="en-US" dirty="0" smtClean="0"/>
+              <a:t>, Html 5, Css3, </a:t>
+            </a:r>
+            <a:r>
+              <a:rPr lang="en-US" dirty="0" err="1" smtClean="0"/>
+              <a:t>Jstl</a:t>
+            </a:r>
+            <a:r>
+              <a:rPr lang="en-US" dirty="0" smtClean="0"/>
+              <a:t>.</a:t>
+            </a:r>
+          </a:p>
+          <a:p>
+            <a:r>
+              <a:rPr lang="en-US" dirty="0" smtClean="0"/>
+              <a:t>Management : </a:t>
+            </a:r>
+            <a:r>
+              <a:rPr lang="en-US" dirty="0" err="1" smtClean="0"/>
+              <a:t>trello</a:t>
+            </a:r>
+            <a:r>
+              <a:rPr lang="en-US" dirty="0" smtClean="0"/>
+              <a:t>.</a:t>
+            </a:r>
+          </a:p>
+          <a:p>
+            <a:pPr lvl="0"/>
+            <a:r>
+              <a:rPr lang="en-US" dirty="0"/>
+              <a:t>Source control: GitHub </a:t>
+            </a:r>
+            <a:endParaRPr lang="en-US" dirty="0" smtClean="0"/>
+          </a:p>
+          <a:p>
+            <a:pPr lvl="0"/>
+            <a:r>
+              <a:rPr lang="en-US" dirty="0" smtClean="0"/>
+              <a:t>Database </a:t>
+            </a:r>
+            <a:r>
+              <a:rPr lang="en-US" dirty="0"/>
+              <a:t>system: </a:t>
+            </a:r>
+            <a:r>
+              <a:rPr lang="en-US" dirty="0" smtClean="0"/>
+              <a:t>MySQL.</a:t>
+            </a:r>
+            <a:endParaRPr lang="en-US" dirty="0"/>
+          </a:p>
+          <a:p>
+            <a:endParaRPr lang="en-US" dirty="0" smtClean="0"/>
+          </a:p>
+          <a:p>
+            <a:endParaRPr lang="en-US" dirty="0"/>
+          </a:p>
+        </p:txBody>
+      </p:sp>
     </p:spTree>
     <p:extLst>
       <p:ext uri="{BB962C8B-B14F-4D97-AF65-F5344CB8AC3E}">
-        <p14:creationId xmlns:p14="http://schemas.microsoft.com/office/powerpoint/2010/main" val="310402103"/>
+        <p14:creationId xmlns:p14="http://schemas.microsoft.com/office/powerpoint/2010/main" val="4119169377"/>
       </p:ext>
     </p:extLst>
   </p:cSld>

</xml_diff>